<commit_message>
Một số thay đổi bài 3 của tôi
</commit_message>
<xml_diff>
--- a/Tuan-1.pptx
+++ b/Tuan-1.pptx
@@ -68,14 +68,14 @@
   <p:notesSz cx="6858000" cy="9144000"/>
   <p:embeddedFontLst>
     <p:embeddedFont>
-      <p:font typeface="Roboto" panose="020B0604020202020204" charset="0"/>
+      <p:font typeface="Roboto" charset="0"/>
       <p:regular r:id="rId58"/>
       <p:bold r:id="rId59"/>
       <p:italic r:id="rId60"/>
       <p:boldItalic r:id="rId61"/>
     </p:embeddedFont>
     <p:embeddedFont>
-      <p:font typeface="Cambria" panose="02040503050406030204" pitchFamily="18" charset="0"/>
+      <p:font typeface="Cambria" pitchFamily="18" charset="0"/>
       <p:regular r:id="rId62"/>
       <p:bold r:id="rId63"/>
       <p:italic r:id="rId64"/>
@@ -16659,8 +16659,29 @@
                 <a:cs typeface="Times New Roman"/>
                 <a:sym typeface="Times New Roman"/>
               </a:rPr>
-              <a:t>Phỏng vấn không có cấu trúc giống như các buổi gặp họp không chính thức, không có câu hỏi định trước cũng như mục tiêu dự kiến. Mục đích của cuộc phỏng vấn không có cấu trúc là để khách hàng nói ra suy nghĩ của họ, và trong quá trình này, gợi ra các yêu cầu mà nhà phân tích mong muốn hoặc không mong muốn, từ đó đặt câu hỏi.</a:t>
-            </a:r>
+              <a:t>Phỏng vấn không có cấu trúc giống như các buổi gặp họp không chính thức, không có câu hỏi định trước cũng như mục tiêu dự kiến. Mục đích của cuộc phỏng vấn không có cấu trúc là để khách hàng nói ra suy nghĩ của họ, và trong quá trình này, gợi ra các yêu cầu mà nhà phân tích mong muốn hoặc không mong </a:t>
+            </a:r>
+            <a:r>
+              <a:rPr lang="vi" dirty="0" smtClean="0">
+                <a:solidFill>
+                  <a:srgbClr val="000000"/>
+                </a:solidFill>
+                <a:latin typeface="Times New Roman"/>
+                <a:ea typeface="Times New Roman"/>
+                <a:cs typeface="Times New Roman"/>
+                <a:sym typeface="Times New Roman"/>
+              </a:rPr>
+              <a:t>muốn.</a:t>
+            </a:r>
+            <a:endParaRPr lang="vi" dirty="0">
+              <a:solidFill>
+                <a:srgbClr val="000000"/>
+              </a:solidFill>
+              <a:latin typeface="Times New Roman"/>
+              <a:ea typeface="Times New Roman"/>
+              <a:cs typeface="Times New Roman"/>
+              <a:sym typeface="Times New Roman"/>
+            </a:endParaRPr>
           </a:p>
           <a:p>
             <a:pPr marL="0" lvl="0" indent="0" algn="just">
@@ -17214,29 +17235,10 @@
                 <a:cs typeface="Times New Roman"/>
                 <a:sym typeface="Times New Roman"/>
               </a:rPr>
-              <a:t>Khả năng thực hiện phỏng vấn ở khoảng cách xa thông qua video.</a:t>
-            </a:r>
-          </a:p>
-          <a:p>
-            <a:pPr marL="449263" lvl="0" indent="-215900" algn="just" rtl="0">
-              <a:lnSpc>
-                <a:spcPct val="115000"/>
-              </a:lnSpc>
-              <a:spcBef>
-                <a:spcPts val="0"/>
-              </a:spcBef>
-              <a:spcAft>
-                <a:spcPts val="0"/>
-              </a:spcAft>
-              <a:buClr>
-                <a:srgbClr val="000000"/>
-              </a:buClr>
-              <a:buSzPct val="61111"/>
-              <a:buFont typeface="Arial"/>
-              <a:buNone/>
-            </a:pPr>
-            <a:r>
-              <a:rPr lang="vi" b="1" dirty="0">
+              <a:t>Khả năng thực hiện phỏng vấn ở khoảng cách </a:t>
+            </a:r>
+            <a:r>
+              <a:rPr lang="vi" sz="1800" dirty="0" smtClean="0">
                 <a:solidFill>
                   <a:srgbClr val="000000"/>
                 </a:solidFill>
@@ -17245,11 +17247,20 @@
                 <a:cs typeface="Times New Roman"/>
                 <a:sym typeface="Times New Roman"/>
               </a:rPr>
-              <a:t>Nhược điểm:</a:t>
-            </a:r>
-          </a:p>
-          <a:p>
-            <a:pPr marL="914400" lvl="0" indent="-342900" algn="just" rtl="0">
+              <a:t>xa.</a:t>
+            </a:r>
+            <a:endParaRPr lang="vi" sz="1800" dirty="0">
+              <a:solidFill>
+                <a:srgbClr val="000000"/>
+              </a:solidFill>
+              <a:latin typeface="Times New Roman"/>
+              <a:ea typeface="Times New Roman"/>
+              <a:cs typeface="Times New Roman"/>
+              <a:sym typeface="Times New Roman"/>
+            </a:endParaRPr>
+          </a:p>
+          <a:p>
+            <a:pPr marL="449263" lvl="0" indent="-215900" algn="just" rtl="0">
               <a:lnSpc>
                 <a:spcPct val="115000"/>
               </a:lnSpc>
@@ -17262,12 +17273,12 @@
               <a:buClr>
                 <a:srgbClr val="000000"/>
               </a:buClr>
-              <a:buSzPct val="100000"/>
-              <a:buFont typeface="Courier New" panose="02070309020205020404" pitchFamily="49" charset="0"/>
-              <a:buChar char="o"/>
-            </a:pPr>
-            <a:r>
-              <a:rPr lang="vi" sz="1800" dirty="0">
+              <a:buSzPct val="61111"/>
+              <a:buFont typeface="Arial"/>
+              <a:buNone/>
+            </a:pPr>
+            <a:r>
+              <a:rPr lang="vi" b="1" dirty="0">
                 <a:solidFill>
                   <a:srgbClr val="000000"/>
                 </a:solidFill>
@@ -17276,7 +17287,7 @@
                 <a:cs typeface="Times New Roman"/>
                 <a:sym typeface="Times New Roman"/>
               </a:rPr>
-              <a:t>Tốn thời gian trong việc thực hiện phỏng vấn cũng như đòi hỏi một số hoạt động theo dõi.</a:t>
+              <a:t>Nhược điểm:</a:t>
             </a:r>
           </a:p>
           <a:p>
@@ -17307,7 +17318,7 @@
                 <a:cs typeface="Times New Roman"/>
                 <a:sym typeface="Times New Roman"/>
               </a:rPr>
-              <a:t>Có thể xảy ra hiểu lầm hoặc hiểu bị sai lệch.</a:t>
+              <a:t>Tốn thời gian trong việc thực hiện phỏng vấn cũng như đòi hỏi một số hoạt động theo dõi.</a:t>
             </a:r>
           </a:p>
           <a:p>
@@ -17319,7 +17330,7 @@
                 <a:spcPts val="0"/>
               </a:spcBef>
               <a:spcAft>
-                <a:spcPts val="2160"/>
+                <a:spcPts val="0"/>
               </a:spcAft>
               <a:buClr>
                 <a:srgbClr val="000000"/>
@@ -17338,8 +17349,60 @@
                 <a:cs typeface="Times New Roman"/>
                 <a:sym typeface="Times New Roman"/>
               </a:rPr>
+              <a:t>Có thể xảy ra hiểu lầm hoặc hiểu bị sai lệch</a:t>
+            </a:r>
+            <a:r>
+              <a:rPr lang="vi" sz="1800" dirty="0" smtClean="0">
+                <a:solidFill>
+                  <a:srgbClr val="000000"/>
+                </a:solidFill>
+                <a:latin typeface="Times New Roman"/>
+                <a:ea typeface="Times New Roman"/>
+                <a:cs typeface="Times New Roman"/>
+                <a:sym typeface="Times New Roman"/>
+              </a:rPr>
+              <a:t>.</a:t>
+            </a:r>
+          </a:p>
+          <a:p>
+            <a:pPr marL="914400" lvl="0" indent="-342900" algn="just" rtl="0">
+              <a:lnSpc>
+                <a:spcPct val="115000"/>
+              </a:lnSpc>
+              <a:spcBef>
+                <a:spcPts val="0"/>
+              </a:spcBef>
+              <a:spcAft>
+                <a:spcPts val="2160"/>
+              </a:spcAft>
+              <a:buClr>
+                <a:srgbClr val="000000"/>
+              </a:buClr>
+              <a:buSzPct val="100000"/>
+              <a:buFont typeface="Courier New" panose="02070309020205020404" pitchFamily="49" charset="0"/>
+              <a:buChar char="o"/>
+            </a:pPr>
+            <a:r>
+              <a:rPr lang="vi" sz="1800" dirty="0" smtClean="0">
+                <a:solidFill>
+                  <a:srgbClr val="000000"/>
+                </a:solidFill>
+                <a:latin typeface="Times New Roman"/>
+                <a:ea typeface="Times New Roman"/>
+                <a:cs typeface="Times New Roman"/>
+                <a:sym typeface="Times New Roman"/>
+              </a:rPr>
               <a:t>Các thông tin thu được có thể trái ngược nhau từ những người được phỏng vấn khác nhau về cùng một vấn đề.</a:t>
             </a:r>
+            <a:endParaRPr lang="vi" sz="1800" dirty="0">
+              <a:solidFill>
+                <a:srgbClr val="000000"/>
+              </a:solidFill>
+              <a:latin typeface="Times New Roman"/>
+              <a:ea typeface="Times New Roman"/>
+              <a:cs typeface="Times New Roman"/>
+              <a:sym typeface="Times New Roman"/>
+            </a:endParaRPr>
           </a:p>
         </p:txBody>
       </p:sp>
@@ -18195,7 +18258,7 @@
               <a:buAutoNum type="alphaLcParenR"/>
             </a:pPr>
             <a:r>
-              <a:rPr lang="vi" b="1">
+              <a:rPr lang="vi" b="1" dirty="0">
                 <a:solidFill>
                   <a:srgbClr val="000000"/>
                 </a:solidFill>
@@ -18221,7 +18284,7 @@
               <a:buNone/>
             </a:pPr>
             <a:r>
-              <a:rPr lang="vi">
+              <a:rPr lang="vi" dirty="0">
                 <a:solidFill>
                   <a:srgbClr val="000000"/>
                 </a:solidFill>
@@ -18230,8 +18293,29 @@
                 <a:cs typeface="Times New Roman"/>
                 <a:sym typeface="Times New Roman"/>
               </a:rPr>
-              <a:t>Bảng hỏi là phương pháp hiệu quả để thu thập thông tin từ nhiều khách hàng. Bảng hỏi thường được sử dụng ngoài các cuộc phỏng vấn và không thay thế.</a:t>
-            </a:r>
+              <a:t>Bảng hỏi là phương pháp hiệu quả để thu thập thông tin từ nhiều khách hàng. Bảng hỏi thường được sử dụng ngoài các cuộc phỏng </a:t>
+            </a:r>
+            <a:r>
+              <a:rPr lang="vi" dirty="0" smtClean="0">
+                <a:solidFill>
+                  <a:srgbClr val="000000"/>
+                </a:solidFill>
+                <a:latin typeface="Times New Roman"/>
+                <a:ea typeface="Times New Roman"/>
+                <a:cs typeface="Times New Roman"/>
+                <a:sym typeface="Times New Roman"/>
+              </a:rPr>
+              <a:t>vấn.</a:t>
+            </a:r>
+            <a:endParaRPr lang="vi" dirty="0">
+              <a:solidFill>
+                <a:srgbClr val="000000"/>
+              </a:solidFill>
+              <a:latin typeface="Times New Roman"/>
+              <a:ea typeface="Times New Roman"/>
+              <a:cs typeface="Times New Roman"/>
+              <a:sym typeface="Times New Roman"/>
+            </a:endParaRPr>
           </a:p>
         </p:txBody>
       </p:sp>
@@ -20891,7 +20975,79 @@
                 <a:cs typeface="Times New Roman"/>
                 <a:sym typeface="Times New Roman"/>
               </a:rPr>
-              <a:t>Là phương pháp nghiên cứu các tài liệu của các doanh nghiệp và hệ thống các biểu mẫu, báo cáo.</a:t>
+              <a:t>Là phương pháp nghiên cứu các tài liệu của các </a:t>
+            </a:r>
+            <a:r>
+              <a:rPr lang="en-US" dirty="0" err="1" smtClean="0">
+                <a:solidFill>
+                  <a:srgbClr val="000000"/>
+                </a:solidFill>
+                <a:latin typeface="Times New Roman"/>
+                <a:ea typeface="Times New Roman"/>
+                <a:cs typeface="Times New Roman"/>
+                <a:sym typeface="Times New Roman"/>
+              </a:rPr>
+              <a:t>tổ</a:t>
+            </a:r>
+            <a:r>
+              <a:rPr lang="en-US" dirty="0" smtClean="0">
+                <a:solidFill>
+                  <a:srgbClr val="000000"/>
+                </a:solidFill>
+                <a:latin typeface="Times New Roman"/>
+                <a:ea typeface="Times New Roman"/>
+                <a:cs typeface="Times New Roman"/>
+                <a:sym typeface="Times New Roman"/>
+              </a:rPr>
+              <a:t> </a:t>
+            </a:r>
+            <a:r>
+              <a:rPr lang="en-US" dirty="0" err="1" smtClean="0">
+                <a:solidFill>
+                  <a:srgbClr val="000000"/>
+                </a:solidFill>
+                <a:latin typeface="Times New Roman"/>
+                <a:ea typeface="Times New Roman"/>
+                <a:cs typeface="Times New Roman"/>
+                <a:sym typeface="Times New Roman"/>
+              </a:rPr>
+              <a:t>chức</a:t>
+            </a:r>
+            <a:r>
+              <a:rPr lang="en-US" smtClean="0">
+                <a:solidFill>
+                  <a:srgbClr val="000000"/>
+                </a:solidFill>
+                <a:latin typeface="Times New Roman"/>
+                <a:ea typeface="Times New Roman"/>
+                <a:cs typeface="Times New Roman"/>
+                <a:sym typeface="Times New Roman"/>
+              </a:rPr>
+              <a:t> </a:t>
+            </a:r>
+            <a:r>
+              <a:rPr lang="vi" smtClean="0">
+                <a:solidFill>
+                  <a:srgbClr val="000000"/>
+                </a:solidFill>
+                <a:latin typeface="Times New Roman"/>
+                <a:ea typeface="Times New Roman"/>
+                <a:cs typeface="Times New Roman"/>
+                <a:sym typeface="Times New Roman"/>
+              </a:rPr>
+              <a:t>và </a:t>
+            </a:r>
+            <a:r>
+              <a:rPr lang="vi" dirty="0">
+                <a:solidFill>
+                  <a:srgbClr val="000000"/>
+                </a:solidFill>
+                <a:latin typeface="Times New Roman"/>
+                <a:ea typeface="Times New Roman"/>
+                <a:cs typeface="Times New Roman"/>
+                <a:sym typeface="Times New Roman"/>
+              </a:rPr>
+              <a:t>hệ thống các biểu mẫu, báo cáo.</a:t>
             </a:r>
           </a:p>
           <a:p>
@@ -24975,19 +25131,7 @@
                 <a:cs typeface="Times New Roman"/>
                 <a:sym typeface="Times New Roman"/>
               </a:rPr>
-              <a:t>Một cuộc họp JAD có thể mất vài giờ, vài ngày thậm chị vài tuần. Số lượng thành viên thường không vượt quá 25 đến 30 người. Những thành viên bao gồm</a:t>
-            </a:r>
-            <a:r>
-              <a:rPr lang="vi" dirty="0">
-                <a:solidFill>
-                  <a:srgbClr val="000000"/>
-                </a:solidFill>
-                <a:latin typeface="Times New Roman"/>
-                <a:ea typeface="Times New Roman"/>
-                <a:cs typeface="Times New Roman"/>
-                <a:sym typeface="Times New Roman"/>
-              </a:rPr>
-              <a:t>:</a:t>
+              <a:t>Một cuộc họp JAD có thể mất vài giờ, vài ngày thậm chị vài tuần. Số lượng thành viên thường không vượt quá 25 đến 30 người. Những thành viên bao gồm:</a:t>
             </a:r>
           </a:p>
           <a:p>

</xml_diff>